<commit_message>
ICEM Poster is updated.
</commit_message>
<xml_diff>
--- a/Other Material/GRW/GradStar 2018 Erencan Duymaz.pptx
+++ b/Other Material/GRW/GradStar 2018 Erencan Duymaz.pptx
@@ -2248,7 +2248,7 @@
           <a:graphicData uri="http://schemas.openxmlformats.org/presentationml/2006/ole">
             <mc:AlternateContent xmlns:mc="http://schemas.openxmlformats.org/markup-compatibility/2006">
               <mc:Choice xmlns:v="urn:schemas-microsoft-com:vml" Requires="v">
-                <p:oleObj spid="_x0000_s1184" name="Visio" r:id="rId9" imgW="11563281" imgH="5696052" progId="Visio.Drawing.15">
+                <p:oleObj spid="_x0000_s1196" name="Visio" r:id="rId9" imgW="11563281" imgH="5696052" progId="Visio.Drawing.15">
                   <p:embed/>
                 </p:oleObj>
               </mc:Choice>
@@ -3205,7 +3205,15 @@
                 <a:latin typeface="Times New Roman" panose="02020603050405020304" pitchFamily="18" charset="0"/>
                 <a:ea typeface="Times New Roman" panose="02020603050405020304" pitchFamily="18" charset="0"/>
               </a:rPr>
-              <a:t>c. Frequency response for the 25% additional load connection</a:t>
+              <a:t>c. Frequency response for the 25% additional load </a:t>
+            </a:r>
+            <a:r>
+              <a:rPr lang="en-US" sz="1800" dirty="0" smtClean="0">
+                <a:effectLst/>
+                <a:latin typeface="Times New Roman" panose="02020603050405020304" pitchFamily="18" charset="0"/>
+                <a:ea typeface="Times New Roman" panose="02020603050405020304" pitchFamily="18" charset="0"/>
+              </a:rPr>
+              <a:t>connection</a:t>
             </a:r>
             <a:endParaRPr lang="tr-TR" sz="1800" dirty="0">
               <a:effectLst/>
@@ -3436,7 +3444,7 @@
           <a:graphicData uri="http://schemas.openxmlformats.org/presentationml/2006/ole">
             <mc:AlternateContent xmlns:mc="http://schemas.openxmlformats.org/markup-compatibility/2006">
               <mc:Choice xmlns:v="urn:schemas-microsoft-com:vml" Requires="v">
-                <p:oleObj spid="_x0000_s1185" name="Visio" r:id="rId18" imgW="3676770" imgH="1209490" progId="Visio.Drawing.15">
+                <p:oleObj spid="_x0000_s1197" name="Visio" r:id="rId18" imgW="3676770" imgH="1209490" progId="Visio.Drawing.15">
                   <p:embed/>
                 </p:oleObj>
               </mc:Choice>
@@ -3629,7 +3637,7 @@
           <a:graphicData uri="http://schemas.openxmlformats.org/presentationml/2006/ole">
             <mc:AlternateContent xmlns:mc="http://schemas.openxmlformats.org/markup-compatibility/2006">
               <mc:Choice xmlns:v="urn:schemas-microsoft-com:vml" Requires="v">
-                <p:oleObj spid="_x0000_s1186" name="Visio" r:id="rId20" imgW="5591012" imgH="1295243" progId="Visio.Drawing.15">
+                <p:oleObj spid="_x0000_s1198" name="Visio" r:id="rId20" imgW="5591012" imgH="1295243" progId="Visio.Drawing.15">
                   <p:embed/>
                 </p:oleObj>
               </mc:Choice>
@@ -3759,7 +3767,7 @@
           <a:graphicData uri="http://schemas.openxmlformats.org/presentationml/2006/ole">
             <mc:AlternateContent xmlns:mc="http://schemas.openxmlformats.org/markup-compatibility/2006">
               <mc:Choice xmlns:v="urn:schemas-microsoft-com:vml" Requires="v">
-                <p:oleObj spid="_x0000_s1187" name="Visio" r:id="rId22" imgW="3848123" imgH="1295243" progId="Visio.Drawing.15">
+                <p:oleObj spid="_x0000_s1199" name="Visio" r:id="rId22" imgW="3848123" imgH="1295243" progId="Visio.Drawing.15">
                   <p:embed/>
                 </p:oleObj>
               </mc:Choice>
@@ -3889,7 +3897,7 @@
           <a:graphicData uri="http://schemas.openxmlformats.org/presentationml/2006/ole">
             <mc:AlternateContent xmlns:mc="http://schemas.openxmlformats.org/markup-compatibility/2006">
               <mc:Choice xmlns:v="urn:schemas-microsoft-com:vml" Requires="v">
-                <p:oleObj spid="_x0000_s1188" name="Visio" r:id="rId24" imgW="3756878" imgH="1310552" progId="Visio.Drawing.15">
+                <p:oleObj spid="_x0000_s1200" name="Visio" r:id="rId24" imgW="3756878" imgH="1310552" progId="Visio.Drawing.15">
                   <p:embed/>
                 </p:oleObj>
               </mc:Choice>
@@ -4674,7 +4682,7 @@
           <a:graphicData uri="http://schemas.openxmlformats.org/presentationml/2006/ole">
             <mc:AlternateContent xmlns:mc="http://schemas.openxmlformats.org/markup-compatibility/2006">
               <mc:Choice xmlns:v="urn:schemas-microsoft-com:vml" Requires="v">
-                <p:oleObj spid="_x0000_s1189" name="Visio" r:id="rId27" imgW="7886844" imgH="2876522" progId="Visio.Drawing.15">
+                <p:oleObj spid="_x0000_s1201" name="Visio" r:id="rId27" imgW="7886844" imgH="2876522" progId="Visio.Drawing.15">
                   <p:embed/>
                 </p:oleObj>
               </mc:Choice>

</xml_diff>